<commit_message>
Update for Kathmandu workshop
</commit_message>
<xml_diff>
--- a/FloodMappingWorkshopIII.pptx
+++ b/FloodMappingWorkshopIII.pptx
@@ -293,7 +293,7 @@
           <a:p>
             <a:fld id="{00470D26-33B2-C54F-862D-A0364FE35CC4}" type="datetimeFigureOut">
               <a:rPr lang="en-US" smtClean="0"/>
-              <a:t>9/23/14</a:t>
+              <a:t>3/6/15</a:t>
             </a:fld>
             <a:endParaRPr lang="en-US"/>
           </a:p>
@@ -463,7 +463,7 @@
           <a:p>
             <a:fld id="{00470D26-33B2-C54F-862D-A0364FE35CC4}" type="datetimeFigureOut">
               <a:rPr lang="en-US" smtClean="0"/>
-              <a:t>9/23/14</a:t>
+              <a:t>3/6/15</a:t>
             </a:fld>
             <a:endParaRPr lang="en-US"/>
           </a:p>
@@ -643,7 +643,7 @@
           <a:p>
             <a:fld id="{00470D26-33B2-C54F-862D-A0364FE35CC4}" type="datetimeFigureOut">
               <a:rPr lang="en-US" smtClean="0"/>
-              <a:t>9/23/14</a:t>
+              <a:t>3/6/15</a:t>
             </a:fld>
             <a:endParaRPr lang="en-US"/>
           </a:p>
@@ -813,7 +813,7 @@
           <a:p>
             <a:fld id="{00470D26-33B2-C54F-862D-A0364FE35CC4}" type="datetimeFigureOut">
               <a:rPr lang="en-US" smtClean="0"/>
-              <a:t>9/23/14</a:t>
+              <a:t>3/6/15</a:t>
             </a:fld>
             <a:endParaRPr lang="en-US"/>
           </a:p>
@@ -1059,7 +1059,7 @@
           <a:p>
             <a:fld id="{00470D26-33B2-C54F-862D-A0364FE35CC4}" type="datetimeFigureOut">
               <a:rPr lang="en-US" smtClean="0"/>
-              <a:t>9/23/14</a:t>
+              <a:t>3/6/15</a:t>
             </a:fld>
             <a:endParaRPr lang="en-US"/>
           </a:p>
@@ -1347,7 +1347,7 @@
           <a:p>
             <a:fld id="{00470D26-33B2-C54F-862D-A0364FE35CC4}" type="datetimeFigureOut">
               <a:rPr lang="en-US" smtClean="0"/>
-              <a:t>9/23/14</a:t>
+              <a:t>3/6/15</a:t>
             </a:fld>
             <a:endParaRPr lang="en-US"/>
           </a:p>
@@ -1769,7 +1769,7 @@
           <a:p>
             <a:fld id="{00470D26-33B2-C54F-862D-A0364FE35CC4}" type="datetimeFigureOut">
               <a:rPr lang="en-US" smtClean="0"/>
-              <a:t>9/23/14</a:t>
+              <a:t>3/6/15</a:t>
             </a:fld>
             <a:endParaRPr lang="en-US"/>
           </a:p>
@@ -1887,7 +1887,7 @@
           <a:p>
             <a:fld id="{00470D26-33B2-C54F-862D-A0364FE35CC4}" type="datetimeFigureOut">
               <a:rPr lang="en-US" smtClean="0"/>
-              <a:t>9/23/14</a:t>
+              <a:t>3/6/15</a:t>
             </a:fld>
             <a:endParaRPr lang="en-US"/>
           </a:p>
@@ -1982,7 +1982,7 @@
           <a:p>
             <a:fld id="{00470D26-33B2-C54F-862D-A0364FE35CC4}" type="datetimeFigureOut">
               <a:rPr lang="en-US" smtClean="0"/>
-              <a:t>9/23/14</a:t>
+              <a:t>3/6/15</a:t>
             </a:fld>
             <a:endParaRPr lang="en-US"/>
           </a:p>
@@ -2259,7 +2259,7 @@
           <a:p>
             <a:fld id="{00470D26-33B2-C54F-862D-A0364FE35CC4}" type="datetimeFigureOut">
               <a:rPr lang="en-US" smtClean="0"/>
-              <a:t>9/23/14</a:t>
+              <a:t>3/6/15</a:t>
             </a:fld>
             <a:endParaRPr lang="en-US"/>
           </a:p>
@@ -2512,7 +2512,7 @@
           <a:p>
             <a:fld id="{00470D26-33B2-C54F-862D-A0364FE35CC4}" type="datetimeFigureOut">
               <a:rPr lang="en-US" smtClean="0"/>
-              <a:t>9/23/14</a:t>
+              <a:t>3/6/15</a:t>
             </a:fld>
             <a:endParaRPr lang="en-US"/>
           </a:p>
@@ -2725,7 +2725,7 @@
           <a:p>
             <a:fld id="{00470D26-33B2-C54F-862D-A0364FE35CC4}" type="datetimeFigureOut">
               <a:rPr lang="en-US" smtClean="0"/>
-              <a:t>9/23/14</a:t>
+              <a:t>3/6/15</a:t>
             </a:fld>
             <a:endParaRPr lang="en-US"/>
           </a:p>
@@ -3161,36 +3161,30 @@
           <a:p>
             <a:r>
               <a:rPr lang="en-US" sz="2000" dirty="0" smtClean="0"/>
-              <a:t>Pat Cappelaere / Stu Frye</a:t>
-            </a:r>
+              <a:t>Pat Cappelaere </a:t>
+            </a:r>
+            <a:endParaRPr lang="en-US" sz="2000" dirty="0" smtClean="0"/>
           </a:p>
           <a:p>
             <a:r>
               <a:rPr lang="en-US" sz="2000" dirty="0" smtClean="0">
                 <a:hlinkClick r:id="rId2"/>
               </a:rPr>
-              <a:t>pat@cappelaere.com</a:t>
+              <a:t>pat</a:t>
+            </a:r>
+            <a:r>
+              <a:rPr lang="en-US" sz="2000" dirty="0" smtClean="0">
+                <a:hlinkClick r:id="rId2"/>
+              </a:rPr>
+              <a:t>@</a:t>
+            </a:r>
+            <a:r>
+              <a:rPr lang="en-US" sz="2000" dirty="0" smtClean="0">
+                <a:hlinkClick r:id="rId2"/>
+              </a:rPr>
+              <a:t>cappelaere.com</a:t>
             </a:r>
             <a:endParaRPr lang="en-US" sz="2000" dirty="0" smtClean="0"/>
-          </a:p>
-          <a:p>
-            <a:r>
-              <a:rPr lang="en-US" sz="2000" dirty="0">
-                <a:hlinkClick r:id="rId3"/>
-              </a:rPr>
-              <a:t>stuart.w.frye@</a:t>
-            </a:r>
-            <a:r>
-              <a:rPr lang="en-US" sz="2000" dirty="0" smtClean="0">
-                <a:hlinkClick r:id="rId3"/>
-              </a:rPr>
-              <a:t>nasa.gov</a:t>
-            </a:r>
-            <a:r>
-              <a:rPr lang="en-US" sz="2000" dirty="0" smtClean="0"/>
-              <a:t> </a:t>
-            </a:r>
-            <a:endParaRPr lang="en-US" sz="2000" dirty="0"/>
           </a:p>
         </p:txBody>
       </p:sp>
@@ -3226,7 +3220,7 @@
           <p:nvPr/>
         </p:nvPicPr>
         <p:blipFill>
-          <a:blip r:embed="rId4"/>
+          <a:blip r:embed="rId3"/>
           <a:stretch>
             <a:fillRect/>
           </a:stretch>
@@ -3250,7 +3244,7 @@
           <p:nvPr/>
         </p:nvPicPr>
         <p:blipFill>
-          <a:blip r:embed="rId5"/>
+          <a:blip r:embed="rId4"/>
           <a:stretch>
             <a:fillRect/>
           </a:stretch>
@@ -3274,7 +3268,7 @@
           <p:nvPr/>
         </p:nvPicPr>
         <p:blipFill rotWithShape="1">
-          <a:blip r:embed="rId6"/>
+          <a:blip r:embed="rId5"/>
           <a:srcRect/>
           <a:stretch/>
         </p:blipFill>
@@ -3297,7 +3291,7 @@
           <p:nvPr/>
         </p:nvPicPr>
         <p:blipFill>
-          <a:blip r:embed="rId7"/>
+          <a:blip r:embed="rId6"/>
           <a:stretch>
             <a:fillRect/>
           </a:stretch>
@@ -3321,7 +3315,7 @@
           <p:nvPr/>
         </p:nvPicPr>
         <p:blipFill>
-          <a:blip r:embed="rId8"/>
+          <a:blip r:embed="rId7"/>
           <a:stretch>
             <a:fillRect/>
           </a:stretch>
@@ -3345,7 +3339,7 @@
           <p:nvPr/>
         </p:nvPicPr>
         <p:blipFill>
-          <a:blip r:embed="rId9"/>
+          <a:blip r:embed="rId8"/>
           <a:stretch>
             <a:fillRect/>
           </a:stretch>
@@ -3443,11 +3437,7 @@
           <a:p>
             <a:r>
               <a:rPr lang="en-US" dirty="0" smtClean="0"/>
-              <a:t>Connect securely to Publisher and retrieve result of an </a:t>
-            </a:r>
-            <a:r>
-              <a:rPr lang="en-US" dirty="0" smtClean="0"/>
-              <a:t>OpenSearch</a:t>
+              <a:t>Connect securely to Publisher and retrieve result of an OpenSearch</a:t>
             </a:r>
           </a:p>
           <a:p>

</xml_diff>